<commit_message>
increase axis text size
</commit_message>
<xml_diff>
--- a/doc/chart_template.pptx
+++ b/doc/chart_template.pptx
@@ -116,7 +116,7 @@
 <file path=ppt/revisionInfo.xml><?xml version="1.0" encoding="utf-8"?>
 <p1510:revInfo xmlns:a="http://schemas.openxmlformats.org/drawingml/2006/main" xmlns:r="http://schemas.openxmlformats.org/officeDocument/2006/relationships" xmlns:p1510="http://schemas.microsoft.com/office/powerpoint/2015/10/main">
   <p1510:revLst>
-    <p1510:client id="{34C5BAA8-FE2E-441E-9BFF-C851BECEA749}" v="253" dt="2019-07-31T15:02:30.412"/>
+    <p1510:client id="{34C5BAA8-FE2E-441E-9BFF-C851BECEA749}" v="272" dt="2019-08-01T01:34:41.718"/>
   </p1510:revLst>
 </p1510:revInfo>
 </file>
@@ -126,18 +126,18 @@
   <pc:docChgLst>
     <pc:chgData name="Brian Gulbis" userId="8ed87ac563b1c39d" providerId="LiveId" clId="{34C5BAA8-FE2E-441E-9BFF-C851BECEA749}"/>
     <pc:docChg chg="addSld modSld">
-      <pc:chgData name="Brian Gulbis" userId="8ed87ac563b1c39d" providerId="LiveId" clId="{34C5BAA8-FE2E-441E-9BFF-C851BECEA749}" dt="2019-07-31T15:02:30.412" v="258" actId="692"/>
+      <pc:chgData name="Brian Gulbis" userId="8ed87ac563b1c39d" providerId="LiveId" clId="{34C5BAA8-FE2E-441E-9BFF-C851BECEA749}" dt="2019-08-01T01:34:41.718" v="277" actId="403"/>
       <pc:docMkLst>
         <pc:docMk/>
       </pc:docMkLst>
       <pc:sldChg chg="modSp mod">
-        <pc:chgData name="Brian Gulbis" userId="8ed87ac563b1c39d" providerId="LiveId" clId="{34C5BAA8-FE2E-441E-9BFF-C851BECEA749}" dt="2019-07-31T13:02:56.599" v="256"/>
+        <pc:chgData name="Brian Gulbis" userId="8ed87ac563b1c39d" providerId="LiveId" clId="{34C5BAA8-FE2E-441E-9BFF-C851BECEA749}" dt="2019-08-01T01:33:19.165" v="269" actId="404"/>
         <pc:sldMkLst>
           <pc:docMk/>
           <pc:sldMk cId="3291821820" sldId="256"/>
         </pc:sldMkLst>
         <pc:graphicFrameChg chg="mod">
-          <ac:chgData name="Brian Gulbis" userId="8ed87ac563b1c39d" providerId="LiveId" clId="{34C5BAA8-FE2E-441E-9BFF-C851BECEA749}" dt="2019-07-31T13:02:56.599" v="256"/>
+          <ac:chgData name="Brian Gulbis" userId="8ed87ac563b1c39d" providerId="LiveId" clId="{34C5BAA8-FE2E-441E-9BFF-C851BECEA749}" dt="2019-08-01T01:33:19.165" v="269" actId="404"/>
           <ac:graphicFrameMkLst>
             <pc:docMk/>
             <pc:sldMk cId="3291821820" sldId="256"/>
@@ -146,13 +146,13 @@
         </pc:graphicFrameChg>
       </pc:sldChg>
       <pc:sldChg chg="addSp modSp add mod">
-        <pc:chgData name="Brian Gulbis" userId="8ed87ac563b1c39d" providerId="LiveId" clId="{34C5BAA8-FE2E-441E-9BFF-C851BECEA749}" dt="2019-07-31T15:02:30.412" v="258" actId="692"/>
+        <pc:chgData name="Brian Gulbis" userId="8ed87ac563b1c39d" providerId="LiveId" clId="{34C5BAA8-FE2E-441E-9BFF-C851BECEA749}" dt="2019-08-01T01:34:41.718" v="277" actId="403"/>
         <pc:sldMkLst>
           <pc:docMk/>
           <pc:sldMk cId="2647159856" sldId="257"/>
         </pc:sldMkLst>
         <pc:graphicFrameChg chg="add mod">
-          <ac:chgData name="Brian Gulbis" userId="8ed87ac563b1c39d" providerId="LiveId" clId="{34C5BAA8-FE2E-441E-9BFF-C851BECEA749}" dt="2019-07-31T15:02:30.412" v="258" actId="692"/>
+          <ac:chgData name="Brian Gulbis" userId="8ed87ac563b1c39d" providerId="LiveId" clId="{34C5BAA8-FE2E-441E-9BFF-C851BECEA749}" dt="2019-08-01T01:34:41.718" v="277" actId="403"/>
           <ac:graphicFrameMkLst>
             <pc:docMk/>
             <pc:sldMk cId="2647159856" sldId="257"/>
@@ -193,7 +193,7 @@
         <a:lstStyle/>
         <a:p>
           <a:pPr>
-            <a:defRPr sz="1862" b="0" i="0" u="none" strike="noStrike" kern="1200" spc="0" baseline="0">
+            <a:defRPr sz="2400" b="0" i="0" u="none" strike="noStrike" kern="1200" spc="0" baseline="0">
               <a:solidFill>
                 <a:schemeClr val="tx1">
                   <a:lumMod val="75000"/>
@@ -927,7 +927,7 @@
               <a:lstStyle/>
               <a:p>
                 <a:pPr>
-                  <a:defRPr sz="1197" b="0" i="0" u="none" strike="noStrike" kern="1200" baseline="0">
+                  <a:defRPr sz="1200" b="0" i="0" u="none" strike="noStrike" kern="1200" baseline="0">
                     <a:solidFill>
                       <a:schemeClr val="accent3">
                         <a:lumMod val="40000"/>
@@ -1106,7 +1106,7 @@
           <a:lstStyle/>
           <a:p>
             <a:pPr>
-              <a:defRPr sz="1197" b="0" i="0" u="none" strike="noStrike" kern="1200" baseline="0">
+              <a:defRPr sz="1400" b="0" i="0" u="none" strike="noStrike" kern="1200" baseline="0">
                 <a:solidFill>
                   <a:schemeClr val="tx1">
                     <a:lumMod val="50000"/>
@@ -1150,7 +1150,7 @@
             <a:lstStyle/>
             <a:p>
               <a:pPr>
-                <a:defRPr sz="1330" b="0" i="0" u="none" strike="noStrike" kern="1200" baseline="0">
+                <a:defRPr sz="1600" b="0" i="0" u="none" strike="noStrike" kern="1200" baseline="0">
                   <a:solidFill>
                     <a:schemeClr val="tx1">
                       <a:lumMod val="50000"/>
@@ -1182,7 +1182,7 @@
           <a:lstStyle/>
           <a:p>
             <a:pPr>
-              <a:defRPr sz="1197" b="0" i="0" u="none" strike="noStrike" kern="1200" baseline="0">
+              <a:defRPr sz="1400" b="0" i="0" u="none" strike="noStrike" kern="1200" baseline="0">
                 <a:solidFill>
                   <a:schemeClr val="tx1">
                     <a:lumMod val="50000"/>
@@ -1271,7 +1271,7 @@
         <a:lstStyle/>
         <a:p>
           <a:pPr>
-            <a:defRPr sz="1862" b="0" i="0" u="none" strike="noStrike" kern="1200" spc="0" baseline="0">
+            <a:defRPr sz="2400" b="0" i="0" u="none" strike="noStrike" kern="1200" spc="0" baseline="0">
               <a:solidFill>
                 <a:schemeClr val="tx1">
                   <a:lumMod val="75000"/>
@@ -3266,7 +3266,7 @@
           <a:lstStyle/>
           <a:p>
             <a:pPr>
-              <a:defRPr sz="1197" b="0" i="0" u="none" strike="noStrike" kern="1200" baseline="0">
+              <a:defRPr sz="1400" b="0" i="0" u="none" strike="noStrike" kern="1200" baseline="0">
                 <a:solidFill>
                   <a:schemeClr val="tx1">
                     <a:lumMod val="50000"/>
@@ -3311,7 +3311,7 @@
             <a:lstStyle/>
             <a:p>
               <a:pPr>
-                <a:defRPr sz="1330" b="0" i="0" u="none" strike="noStrike" kern="1200" baseline="0">
+                <a:defRPr sz="1600" b="0" i="0" u="none" strike="noStrike" kern="1200" baseline="0">
                   <a:solidFill>
                     <a:schemeClr val="tx1">
                       <a:lumMod val="50000"/>
@@ -3343,7 +3343,7 @@
           <a:lstStyle/>
           <a:p>
             <a:pPr>
-              <a:defRPr sz="1197" b="0" i="0" u="none" strike="noStrike" kern="1200" baseline="0">
+              <a:defRPr sz="1400" b="0" i="0" u="none" strike="noStrike" kern="1200" baseline="0">
                 <a:solidFill>
                   <a:schemeClr val="tx1">
                     <a:lumMod val="50000"/>
@@ -7388,7 +7388,7 @@
           <p:nvPr>
             <p:extLst>
               <p:ext uri="{D42A27DB-BD31-4B8C-83A1-F6EECF244321}">
-                <p14:modId xmlns:p14="http://schemas.microsoft.com/office/powerpoint/2010/main" val="1920972897"/>
+                <p14:modId xmlns:p14="http://schemas.microsoft.com/office/powerpoint/2010/main" val="4282803991"/>
               </p:ext>
             </p:extLst>
           </p:nvPr>
@@ -7446,7 +7446,7 @@
           <p:nvPr>
             <p:extLst>
               <p:ext uri="{D42A27DB-BD31-4B8C-83A1-F6EECF244321}">
-                <p14:modId xmlns:p14="http://schemas.microsoft.com/office/powerpoint/2010/main" val="315653492"/>
+                <p14:modId xmlns:p14="http://schemas.microsoft.com/office/powerpoint/2010/main" val="2058682408"/>
               </p:ext>
             </p:extLst>
           </p:nvPr>

</xml_diff>